<commit_message>
Lesson 10 Solutions and Lesson 11 Corrections
Lesson 10 Solutions added and Lesson 11 corrected
</commit_message>
<xml_diff>
--- a/11/presentation/wda11_Evaluation.pptx
+++ b/11/presentation/wda11_Evaluation.pptx
@@ -219,7 +219,7 @@
           <a:p>
             <a:fld id="{7D261E44-C4C0-6344-AB31-495F47CEF0BF}" type="datetimeFigureOut">
               <a:rPr lang="sk-SK" smtClean="0"/>
-              <a:t>4.4.19</a:t>
+              <a:t>2. 12. 2019</a:t>
             </a:fld>
             <a:endParaRPr lang="sk-SK"/>
           </a:p>
@@ -618,7 +618,7 @@
           <a:p>
             <a:fld id="{A066C677-8E45-E141-9716-C86D7EE5D9E8}" type="datetime1">
               <a:rPr lang="sk-SK" smtClean="0"/>
-              <a:t>4.4.19</a:t>
+              <a:t>2. 12. 2019</a:t>
             </a:fld>
             <a:endParaRPr lang="en-US"/>
           </a:p>
@@ -788,7 +788,7 @@
           <a:p>
             <a:fld id="{2F1614C0-FE52-F449-9EB9-A0FF9A2543CD}" type="datetime1">
               <a:rPr lang="sk-SK" smtClean="0"/>
-              <a:t>4.4.19</a:t>
+              <a:t>2. 12. 2019</a:t>
             </a:fld>
             <a:endParaRPr lang="en-US"/>
           </a:p>
@@ -968,7 +968,7 @@
           <a:p>
             <a:fld id="{D00EA2FD-E00D-9848-8434-0267DBC70800}" type="datetime1">
               <a:rPr lang="sk-SK" smtClean="0"/>
-              <a:t>4.4.19</a:t>
+              <a:t>2. 12. 2019</a:t>
             </a:fld>
             <a:endParaRPr lang="en-US"/>
           </a:p>
@@ -1138,7 +1138,7 @@
           <a:p>
             <a:fld id="{EA230261-6B22-9D46-9363-FF39813EB6EC}" type="datetime1">
               <a:rPr lang="sk-SK" smtClean="0"/>
-              <a:t>4.4.19</a:t>
+              <a:t>2. 12. 2019</a:t>
             </a:fld>
             <a:endParaRPr lang="en-US"/>
           </a:p>
@@ -1382,7 +1382,7 @@
           <a:p>
             <a:fld id="{59FB9737-2E3E-7648-A62E-672F14D45174}" type="datetime1">
               <a:rPr lang="sk-SK" smtClean="0"/>
-              <a:t>4.4.19</a:t>
+              <a:t>2. 12. 2019</a:t>
             </a:fld>
             <a:endParaRPr lang="en-US"/>
           </a:p>
@@ -1614,7 +1614,7 @@
           <a:p>
             <a:fld id="{CE392BCD-50BB-5C4E-9FA2-1520C47BA1A9}" type="datetime1">
               <a:rPr lang="sk-SK" smtClean="0"/>
-              <a:t>4.4.19</a:t>
+              <a:t>2. 12. 2019</a:t>
             </a:fld>
             <a:endParaRPr lang="en-US"/>
           </a:p>
@@ -1981,7 +1981,7 @@
           <a:p>
             <a:fld id="{47588235-1A3D-8F40-84C0-D3E6FA642448}" type="datetime1">
               <a:rPr lang="sk-SK" smtClean="0"/>
-              <a:t>4.4.19</a:t>
+              <a:t>2. 12. 2019</a:t>
             </a:fld>
             <a:endParaRPr lang="en-US"/>
           </a:p>
@@ -2099,7 +2099,7 @@
           <a:p>
             <a:fld id="{C41B8640-B450-0C4A-9516-6E2711D4D46C}" type="datetime1">
               <a:rPr lang="sk-SK" smtClean="0"/>
-              <a:t>4.4.19</a:t>
+              <a:t>2. 12. 2019</a:t>
             </a:fld>
             <a:endParaRPr lang="en-US"/>
           </a:p>
@@ -2194,7 +2194,7 @@
           <a:p>
             <a:fld id="{6B0C531D-6297-E049-BA84-34FE8FD92947}" type="datetime1">
               <a:rPr lang="sk-SK" smtClean="0"/>
-              <a:t>4.4.19</a:t>
+              <a:t>2. 12. 2019</a:t>
             </a:fld>
             <a:endParaRPr lang="en-US"/>
           </a:p>
@@ -2471,7 +2471,7 @@
           <a:p>
             <a:fld id="{5410C6F4-3FBB-2D4D-B13A-D6953AE0A3AF}" type="datetime1">
               <a:rPr lang="sk-SK" smtClean="0"/>
-              <a:t>4.4.19</a:t>
+              <a:t>2. 12. 2019</a:t>
             </a:fld>
             <a:endParaRPr lang="en-US"/>
           </a:p>
@@ -2728,7 +2728,7 @@
           <a:p>
             <a:fld id="{637C8A6D-C806-FE45-AB4E-63619D22D102}" type="datetime1">
               <a:rPr lang="sk-SK" smtClean="0"/>
-              <a:t>4.4.19</a:t>
+              <a:t>2. 12. 2019</a:t>
             </a:fld>
             <a:endParaRPr lang="en-US"/>
           </a:p>
@@ -2941,7 +2941,7 @@
           <a:p>
             <a:fld id="{5F80EA03-2C13-2441-AAFA-2B3D759DC539}" type="datetime1">
               <a:rPr lang="sk-SK" smtClean="0"/>
-              <a:t>4.4.19</a:t>
+              <a:t>2. 12. 2019</a:t>
             </a:fld>
             <a:endParaRPr lang="en-US"/>
           </a:p>
@@ -3712,18 +3712,25 @@
           </a:lstStyle>
           <a:p>
             <a:r>
-              <a:rPr lang="en-US" sz="2800" dirty="0" err="1">
-                <a:latin typeface="Arial" panose="020B0604020202020204" pitchFamily="34" charset="0"/>
-                <a:cs typeface="Arial" panose="020B0604020202020204" pitchFamily="34" charset="0"/>
-              </a:rPr>
-              <a:t>Presnosť</a:t>
+              <a:rPr lang="sk-SK" sz="2800">
+                <a:latin typeface="Arial" panose="020B0604020202020204" pitchFamily="34" charset="0"/>
+                <a:cs typeface="Arial" panose="020B0604020202020204" pitchFamily="34" charset="0"/>
+              </a:rPr>
+              <a:t>Úspešnosť</a:t>
+            </a:r>
+            <a:r>
+              <a:rPr lang="en-US" sz="2800">
+                <a:latin typeface="Arial" panose="020B0604020202020204" pitchFamily="34" charset="0"/>
+                <a:cs typeface="Arial" panose="020B0604020202020204" pitchFamily="34" charset="0"/>
+              </a:rPr>
+              <a:t> </a:t>
             </a:r>
             <a:r>
               <a:rPr lang="en-US" sz="2800" dirty="0">
                 <a:latin typeface="Arial" panose="020B0604020202020204" pitchFamily="34" charset="0"/>
                 <a:cs typeface="Arial" panose="020B0604020202020204" pitchFamily="34" charset="0"/>
               </a:rPr>
-              <a:t> (Accuracy): </a:t>
+              <a:t>(Accuracy): </a:t>
             </a:r>
             <a:r>
               <a:rPr lang="en-US" sz="2800" dirty="0" err="1">
@@ -4545,7 +4552,7 @@
         <p:spPr>
           <a:xfrm>
             <a:off x="806700" y="5818870"/>
-            <a:ext cx="7628883" cy="1384995"/>
+            <a:ext cx="7883697" cy="1384995"/>
           </a:xfrm>
           <a:prstGeom prst="rect">
             <a:avLst/>
@@ -4559,8 +4566,12 @@
           <a:lstStyle/>
           <a:p>
             <a:r>
+              <a:rPr lang="sk-SK" sz="2800"/>
+              <a:t>Úspešnosť </a:t>
+            </a:r>
+            <a:r>
               <a:rPr lang="sk-SK" sz="2800" dirty="0"/>
-              <a:t>Presnosť (</a:t>
+              <a:t>(</a:t>
             </a:r>
             <a:r>
               <a:rPr lang="sk-SK" sz="2800" dirty="0" err="1"/>

</xml_diff>